<commit_message>
add using apis lecture
</commit_message>
<xml_diff>
--- a/ApiConsumption/ApiQuestions.pptx
+++ b/ApiConsumption/ApiQuestions.pptx
@@ -4121,9 +4121,7 @@
             <a:r>
               <a:rPr lang="en-US" sz="3600" dirty="0">
                 <a:solidFill>
-                  <a:schemeClr val="tx1">
-                    <a:lumMod val="50000"/>
-                  </a:schemeClr>
+                  <a:schemeClr val="accent6"/>
                 </a:solidFill>
               </a:rPr>
               <a:t>Remember...</a:t>
@@ -4141,11 +4139,11 @@
   <p:clrMapOvr>
     <a:masterClrMapping/>
   </p:clrMapOvr>
-  <mc:AlternateContent xmlns:mc="http://schemas.openxmlformats.org/markup-compatibility/2006">
-    <mc:Choice xmlns:p14="http://schemas.microsoft.com/office/powerpoint/2010/main" Requires="p14">
+  <mc:AlternateContent xmlns:mc="http://schemas.openxmlformats.org/markup-compatibility/2006" xmlns:p14="http://schemas.microsoft.com/office/powerpoint/2010/main">
+    <mc:Choice Requires="p14">
       <p:transition p14:dur="0"/>
     </mc:Choice>
-    <mc:Fallback>
+    <mc:Fallback xmlns="">
       <p:transition/>
     </mc:Fallback>
   </mc:AlternateContent>
@@ -4252,11 +4250,11 @@
   <p:clrMapOvr>
     <a:masterClrMapping/>
   </p:clrMapOvr>
-  <mc:AlternateContent xmlns:mc="http://schemas.openxmlformats.org/markup-compatibility/2006">
-    <mc:Choice xmlns:p14="http://schemas.microsoft.com/office/powerpoint/2010/main" Requires="p14">
+  <mc:AlternateContent xmlns:mc="http://schemas.openxmlformats.org/markup-compatibility/2006" xmlns:p14="http://schemas.microsoft.com/office/powerpoint/2010/main">
+    <mc:Choice Requires="p14">
       <p:transition p14:dur="0"/>
     </mc:Choice>
-    <mc:Fallback>
+    <mc:Fallback xmlns="">
       <p:transition/>
     </mc:Fallback>
   </mc:AlternateContent>
@@ -4457,11 +4455,11 @@
   <p:clrMapOvr>
     <a:masterClrMapping/>
   </p:clrMapOvr>
-  <mc:AlternateContent xmlns:mc="http://schemas.openxmlformats.org/markup-compatibility/2006">
-    <mc:Choice xmlns:p14="http://schemas.microsoft.com/office/powerpoint/2010/main" Requires="p14">
+  <mc:AlternateContent xmlns:mc="http://schemas.openxmlformats.org/markup-compatibility/2006" xmlns:p14="http://schemas.microsoft.com/office/powerpoint/2010/main">
+    <mc:Choice Requires="p14">
       <p:transition p14:dur="0"/>
     </mc:Choice>
-    <mc:Fallback>
+    <mc:Fallback xmlns="">
       <p:transition/>
     </mc:Fallback>
   </mc:AlternateContent>
@@ -4662,11 +4660,11 @@
   <p:clrMapOvr>
     <a:masterClrMapping/>
   </p:clrMapOvr>
-  <mc:AlternateContent xmlns:mc="http://schemas.openxmlformats.org/markup-compatibility/2006">
-    <mc:Choice xmlns:p14="http://schemas.microsoft.com/office/powerpoint/2010/main" Requires="p14">
+  <mc:AlternateContent xmlns:mc="http://schemas.openxmlformats.org/markup-compatibility/2006" xmlns:p14="http://schemas.microsoft.com/office/powerpoint/2010/main">
+    <mc:Choice Requires="p14">
       <p:transition p14:dur="0"/>
     </mc:Choice>
-    <mc:Fallback>
+    <mc:Fallback xmlns="">
       <p:transition/>
     </mc:Fallback>
   </mc:AlternateContent>
@@ -4867,11 +4865,11 @@
   <p:clrMapOvr>
     <a:masterClrMapping/>
   </p:clrMapOvr>
-  <mc:AlternateContent xmlns:mc="http://schemas.openxmlformats.org/markup-compatibility/2006">
-    <mc:Choice xmlns:p14="http://schemas.microsoft.com/office/powerpoint/2010/main" Requires="p14">
+  <mc:AlternateContent xmlns:mc="http://schemas.openxmlformats.org/markup-compatibility/2006" xmlns:p14="http://schemas.microsoft.com/office/powerpoint/2010/main">
+    <mc:Choice Requires="p14">
       <p:transition p14:dur="0"/>
     </mc:Choice>
-    <mc:Fallback>
+    <mc:Fallback xmlns="">
       <p:transition/>
     </mc:Fallback>
   </mc:AlternateContent>
@@ -5074,11 +5072,11 @@
   <p:clrMapOvr>
     <a:masterClrMapping/>
   </p:clrMapOvr>
-  <mc:AlternateContent xmlns:mc="http://schemas.openxmlformats.org/markup-compatibility/2006">
-    <mc:Choice xmlns:p14="http://schemas.microsoft.com/office/powerpoint/2010/main" Requires="p14">
+  <mc:AlternateContent xmlns:mc="http://schemas.openxmlformats.org/markup-compatibility/2006" xmlns:p14="http://schemas.microsoft.com/office/powerpoint/2010/main">
+    <mc:Choice Requires="p14">
       <p:transition p14:dur="0"/>
     </mc:Choice>
-    <mc:Fallback>
+    <mc:Fallback xmlns="">
       <p:transition/>
     </mc:Fallback>
   </mc:AlternateContent>
@@ -5281,11 +5279,11 @@
   <p:clrMapOvr>
     <a:masterClrMapping/>
   </p:clrMapOvr>
-  <mc:AlternateContent xmlns:mc="http://schemas.openxmlformats.org/markup-compatibility/2006">
-    <mc:Choice xmlns:p14="http://schemas.microsoft.com/office/powerpoint/2010/main" Requires="p14">
+  <mc:AlternateContent xmlns:mc="http://schemas.openxmlformats.org/markup-compatibility/2006" xmlns:p14="http://schemas.microsoft.com/office/powerpoint/2010/main">
+    <mc:Choice Requires="p14">
       <p:transition p14:dur="0"/>
     </mc:Choice>
-    <mc:Fallback>
+    <mc:Fallback xmlns="">
       <p:transition/>
     </mc:Fallback>
   </mc:AlternateContent>
@@ -5483,11 +5481,11 @@
   <p:clrMapOvr>
     <a:masterClrMapping/>
   </p:clrMapOvr>
-  <mc:AlternateContent xmlns:mc="http://schemas.openxmlformats.org/markup-compatibility/2006">
-    <mc:Choice xmlns:p14="http://schemas.microsoft.com/office/powerpoint/2010/main" Requires="p14">
+  <mc:AlternateContent xmlns:mc="http://schemas.openxmlformats.org/markup-compatibility/2006" xmlns:p14="http://schemas.microsoft.com/office/powerpoint/2010/main">
+    <mc:Choice Requires="p14">
       <p:transition p14:dur="0"/>
     </mc:Choice>
-    <mc:Fallback>
+    <mc:Fallback xmlns="">
       <p:transition/>
     </mc:Fallback>
   </mc:AlternateContent>
@@ -5690,11 +5688,11 @@
   <p:clrMapOvr>
     <a:masterClrMapping/>
   </p:clrMapOvr>
-  <mc:AlternateContent xmlns:mc="http://schemas.openxmlformats.org/markup-compatibility/2006">
-    <mc:Choice xmlns:p14="http://schemas.microsoft.com/office/powerpoint/2010/main" Requires="p14">
+  <mc:AlternateContent xmlns:mc="http://schemas.openxmlformats.org/markup-compatibility/2006" xmlns:p14="http://schemas.microsoft.com/office/powerpoint/2010/main">
+    <mc:Choice Requires="p14">
       <p:transition p14:dur="0"/>
     </mc:Choice>
-    <mc:Fallback>
+    <mc:Fallback xmlns="">
       <p:transition/>
     </mc:Fallback>
   </mc:AlternateContent>
@@ -5909,11 +5907,11 @@
   <p:clrMapOvr>
     <a:masterClrMapping/>
   </p:clrMapOvr>
-  <mc:AlternateContent xmlns:mc="http://schemas.openxmlformats.org/markup-compatibility/2006">
-    <mc:Choice xmlns:p14="http://schemas.microsoft.com/office/powerpoint/2010/main" Requires="p14">
+  <mc:AlternateContent xmlns:mc="http://schemas.openxmlformats.org/markup-compatibility/2006" xmlns:p14="http://schemas.microsoft.com/office/powerpoint/2010/main">
+    <mc:Choice Requires="p14">
       <p:transition p14:dur="0"/>
     </mc:Choice>
-    <mc:Fallback>
+    <mc:Fallback xmlns="">
       <p:transition/>
     </mc:Fallback>
   </mc:AlternateContent>
@@ -6116,11 +6114,11 @@
   <p:clrMapOvr>
     <a:masterClrMapping/>
   </p:clrMapOvr>
-  <mc:AlternateContent xmlns:mc="http://schemas.openxmlformats.org/markup-compatibility/2006">
-    <mc:Choice xmlns:p14="http://schemas.microsoft.com/office/powerpoint/2010/main" Requires="p14">
+  <mc:AlternateContent xmlns:mc="http://schemas.openxmlformats.org/markup-compatibility/2006" xmlns:p14="http://schemas.microsoft.com/office/powerpoint/2010/main">
+    <mc:Choice Requires="p14">
       <p:transition p14:dur="0"/>
     </mc:Choice>
-    <mc:Fallback>
+    <mc:Fallback xmlns="">
       <p:transition/>
     </mc:Fallback>
   </mc:AlternateContent>
@@ -6337,11 +6335,11 @@
   <p:clrMapOvr>
     <a:masterClrMapping/>
   </p:clrMapOvr>
-  <mc:AlternateContent xmlns:mc="http://schemas.openxmlformats.org/markup-compatibility/2006">
-    <mc:Choice xmlns:p14="http://schemas.microsoft.com/office/powerpoint/2010/main" Requires="p14">
+  <mc:AlternateContent xmlns:mc="http://schemas.openxmlformats.org/markup-compatibility/2006" xmlns:p14="http://schemas.microsoft.com/office/powerpoint/2010/main">
+    <mc:Choice Requires="p14">
       <p:transition p14:dur="0"/>
     </mc:Choice>
-    <mc:Fallback>
+    <mc:Fallback xmlns="">
       <p:transition/>
     </mc:Fallback>
   </mc:AlternateContent>
@@ -6760,11 +6758,11 @@
   <p:clrMapOvr>
     <a:masterClrMapping/>
   </p:clrMapOvr>
-  <mc:AlternateContent xmlns:mc="http://schemas.openxmlformats.org/markup-compatibility/2006">
-    <mc:Choice xmlns:p14="http://schemas.microsoft.com/office/powerpoint/2010/main" Requires="p14">
+  <mc:AlternateContent xmlns:mc="http://schemas.openxmlformats.org/markup-compatibility/2006" xmlns:p14="http://schemas.microsoft.com/office/powerpoint/2010/main">
+    <mc:Choice Requires="p14">
       <p:transition p14:dur="0"/>
     </mc:Choice>
-    <mc:Fallback>
+    <mc:Fallback xmlns="">
       <p:transition/>
     </mc:Fallback>
   </mc:AlternateContent>
@@ -7185,11 +7183,11 @@
   <p:clrMapOvr>
     <a:masterClrMapping/>
   </p:clrMapOvr>
-  <mc:AlternateContent xmlns:mc="http://schemas.openxmlformats.org/markup-compatibility/2006">
-    <mc:Choice xmlns:p14="http://schemas.microsoft.com/office/powerpoint/2010/main" Requires="p14">
+  <mc:AlternateContent xmlns:mc="http://schemas.openxmlformats.org/markup-compatibility/2006" xmlns:p14="http://schemas.microsoft.com/office/powerpoint/2010/main">
+    <mc:Choice Requires="p14">
       <p:transition p14:dur="0"/>
     </mc:Choice>
-    <mc:Fallback>
+    <mc:Fallback xmlns="">
       <p:transition/>
     </mc:Fallback>
   </mc:AlternateContent>
@@ -7610,11 +7608,11 @@
   <p:clrMapOvr>
     <a:masterClrMapping/>
   </p:clrMapOvr>
-  <mc:AlternateContent xmlns:mc="http://schemas.openxmlformats.org/markup-compatibility/2006">
-    <mc:Choice xmlns:p14="http://schemas.microsoft.com/office/powerpoint/2010/main" Requires="p14">
+  <mc:AlternateContent xmlns:mc="http://schemas.openxmlformats.org/markup-compatibility/2006" xmlns:p14="http://schemas.microsoft.com/office/powerpoint/2010/main">
+    <mc:Choice Requires="p14">
       <p:transition p14:dur="0"/>
     </mc:Choice>
-    <mc:Fallback>
+    <mc:Fallback xmlns="">
       <p:transition/>
     </mc:Fallback>
   </mc:AlternateContent>
@@ -8033,11 +8031,11 @@
   <p:clrMapOvr>
     <a:masterClrMapping/>
   </p:clrMapOvr>
-  <mc:AlternateContent xmlns:mc="http://schemas.openxmlformats.org/markup-compatibility/2006">
-    <mc:Choice xmlns:p14="http://schemas.microsoft.com/office/powerpoint/2010/main" Requires="p14">
+  <mc:AlternateContent xmlns:mc="http://schemas.openxmlformats.org/markup-compatibility/2006" xmlns:p14="http://schemas.microsoft.com/office/powerpoint/2010/main">
+    <mc:Choice Requires="p14">
       <p:transition p14:dur="0"/>
     </mc:Choice>
-    <mc:Fallback>
+    <mc:Fallback xmlns="">
       <p:transition/>
     </mc:Fallback>
   </mc:AlternateContent>
@@ -8256,11 +8254,11 @@
   <p:clrMapOvr>
     <a:masterClrMapping/>
   </p:clrMapOvr>
-  <mc:AlternateContent xmlns:mc="http://schemas.openxmlformats.org/markup-compatibility/2006">
-    <mc:Choice xmlns:p14="http://schemas.microsoft.com/office/powerpoint/2010/main" Requires="p14">
+  <mc:AlternateContent xmlns:mc="http://schemas.openxmlformats.org/markup-compatibility/2006" xmlns:p14="http://schemas.microsoft.com/office/powerpoint/2010/main">
+    <mc:Choice Requires="p14">
       <p:transition p14:dur="0"/>
     </mc:Choice>
-    <mc:Fallback>
+    <mc:Fallback xmlns="">
       <p:transition/>
     </mc:Fallback>
   </mc:AlternateContent>
@@ -8537,11 +8535,11 @@
   <p:clrMapOvr>
     <a:masterClrMapping/>
   </p:clrMapOvr>
-  <mc:AlternateContent xmlns:mc="http://schemas.openxmlformats.org/markup-compatibility/2006">
-    <mc:Choice xmlns:p14="http://schemas.microsoft.com/office/powerpoint/2010/main" Requires="p14">
+  <mc:AlternateContent xmlns:mc="http://schemas.openxmlformats.org/markup-compatibility/2006" xmlns:p14="http://schemas.microsoft.com/office/powerpoint/2010/main">
+    <mc:Choice Requires="p14">
       <p:transition p14:dur="0"/>
     </mc:Choice>
-    <mc:Fallback>
+    <mc:Fallback xmlns="">
       <p:transition/>
     </mc:Fallback>
   </mc:AlternateContent>
@@ -8744,11 +8742,11 @@
   <p:clrMapOvr>
     <a:masterClrMapping/>
   </p:clrMapOvr>
-  <mc:AlternateContent xmlns:mc="http://schemas.openxmlformats.org/markup-compatibility/2006">
-    <mc:Choice xmlns:p14="http://schemas.microsoft.com/office/powerpoint/2010/main" Requires="p14">
+  <mc:AlternateContent xmlns:mc="http://schemas.openxmlformats.org/markup-compatibility/2006" xmlns:p14="http://schemas.microsoft.com/office/powerpoint/2010/main">
+    <mc:Choice Requires="p14">
       <p:transition p14:dur="0"/>
     </mc:Choice>
-    <mc:Fallback>
+    <mc:Fallback xmlns="">
       <p:transition/>
     </mc:Fallback>
   </mc:AlternateContent>
@@ -8937,9 +8935,7 @@
             <a:r>
               <a:rPr lang="en-US" sz="3600" dirty="0">
                 <a:solidFill>
-                  <a:schemeClr val="tx1">
-                    <a:lumMod val="50000"/>
-                  </a:schemeClr>
+                  <a:schemeClr val="accent6"/>
                 </a:solidFill>
               </a:rPr>
               <a:t>Questions?</a:t>
@@ -8957,11 +8953,11 @@
   <p:clrMapOvr>
     <a:masterClrMapping/>
   </p:clrMapOvr>
-  <mc:AlternateContent xmlns:mc="http://schemas.openxmlformats.org/markup-compatibility/2006">
-    <mc:Choice xmlns:p14="http://schemas.microsoft.com/office/powerpoint/2010/main" Requires="p14">
+  <mc:AlternateContent xmlns:mc="http://schemas.openxmlformats.org/markup-compatibility/2006" xmlns:p14="http://schemas.microsoft.com/office/powerpoint/2010/main">
+    <mc:Choice Requires="p14">
       <p:transition p14:dur="0"/>
     </mc:Choice>
-    <mc:Fallback>
+    <mc:Fallback xmlns="">
       <p:transition/>
     </mc:Fallback>
   </mc:AlternateContent>
@@ -9084,11 +9080,11 @@
   <p:clrMapOvr>
     <a:masterClrMapping/>
   </p:clrMapOvr>
-  <mc:AlternateContent xmlns:mc="http://schemas.openxmlformats.org/markup-compatibility/2006">
-    <mc:Choice xmlns:p14="http://schemas.microsoft.com/office/powerpoint/2010/main" Requires="p14">
+  <mc:AlternateContent xmlns:mc="http://schemas.openxmlformats.org/markup-compatibility/2006" xmlns:p14="http://schemas.microsoft.com/office/powerpoint/2010/main">
+    <mc:Choice Requires="p14">
       <p:transition p14:dur="0"/>
     </mc:Choice>
-    <mc:Fallback>
+    <mc:Fallback xmlns="">
       <p:transition/>
     </mc:Fallback>
   </mc:AlternateContent>
@@ -9305,11 +9301,11 @@
   <p:clrMapOvr>
     <a:masterClrMapping/>
   </p:clrMapOvr>
-  <mc:AlternateContent xmlns:mc="http://schemas.openxmlformats.org/markup-compatibility/2006">
-    <mc:Choice xmlns:p14="http://schemas.microsoft.com/office/powerpoint/2010/main" Requires="p14">
+  <mc:AlternateContent xmlns:mc="http://schemas.openxmlformats.org/markup-compatibility/2006" xmlns:p14="http://schemas.microsoft.com/office/powerpoint/2010/main">
+    <mc:Choice Requires="p14">
       <p:transition p14:dur="0"/>
     </mc:Choice>
-    <mc:Fallback>
+    <mc:Fallback xmlns="">
       <p:transition/>
     </mc:Fallback>
   </mc:AlternateContent>
@@ -9558,11 +9554,11 @@
   <p:clrMapOvr>
     <a:masterClrMapping/>
   </p:clrMapOvr>
-  <mc:AlternateContent xmlns:mc="http://schemas.openxmlformats.org/markup-compatibility/2006">
-    <mc:Choice xmlns:p14="http://schemas.microsoft.com/office/powerpoint/2010/main" Requires="p14">
+  <mc:AlternateContent xmlns:mc="http://schemas.openxmlformats.org/markup-compatibility/2006" xmlns:p14="http://schemas.microsoft.com/office/powerpoint/2010/main">
+    <mc:Choice Requires="p14">
       <p:transition p14:dur="0"/>
     </mc:Choice>
-    <mc:Fallback>
+    <mc:Fallback xmlns="">
       <p:transition/>
     </mc:Fallback>
   </mc:AlternateContent>
@@ -9872,11 +9868,11 @@
   <p:clrMapOvr>
     <a:masterClrMapping/>
   </p:clrMapOvr>
-  <mc:AlternateContent xmlns:mc="http://schemas.openxmlformats.org/markup-compatibility/2006">
-    <mc:Choice xmlns:p14="http://schemas.microsoft.com/office/powerpoint/2010/main" Requires="p14">
+  <mc:AlternateContent xmlns:mc="http://schemas.openxmlformats.org/markup-compatibility/2006" xmlns:p14="http://schemas.microsoft.com/office/powerpoint/2010/main">
+    <mc:Choice Requires="p14">
       <p:transition p14:dur="0"/>
     </mc:Choice>
-    <mc:Fallback>
+    <mc:Fallback xmlns="">
       <p:transition/>
     </mc:Fallback>
   </mc:AlternateContent>
@@ -10137,11 +10133,11 @@
   <p:clrMapOvr>
     <a:masterClrMapping/>
   </p:clrMapOvr>
-  <mc:AlternateContent xmlns:mc="http://schemas.openxmlformats.org/markup-compatibility/2006">
-    <mc:Choice xmlns:p14="http://schemas.microsoft.com/office/powerpoint/2010/main" Requires="p14">
+  <mc:AlternateContent xmlns:mc="http://schemas.openxmlformats.org/markup-compatibility/2006" xmlns:p14="http://schemas.microsoft.com/office/powerpoint/2010/main">
+    <mc:Choice Requires="p14">
       <p:transition p14:dur="0"/>
     </mc:Choice>
-    <mc:Fallback>
+    <mc:Fallback xmlns="">
       <p:transition/>
     </mc:Fallback>
   </mc:AlternateContent>
@@ -10514,11 +10510,11 @@
   <p:clrMapOvr>
     <a:masterClrMapping/>
   </p:clrMapOvr>
-  <mc:AlternateContent xmlns:mc="http://schemas.openxmlformats.org/markup-compatibility/2006">
-    <mc:Choice xmlns:p14="http://schemas.microsoft.com/office/powerpoint/2010/main" Requires="p14">
+  <mc:AlternateContent xmlns:mc="http://schemas.openxmlformats.org/markup-compatibility/2006" xmlns:p14="http://schemas.microsoft.com/office/powerpoint/2010/main">
+    <mc:Choice Requires="p14">
       <p:transition p14:dur="0"/>
     </mc:Choice>
-    <mc:Fallback>
+    <mc:Fallback xmlns="">
       <p:transition/>
     </mc:Fallback>
   </mc:AlternateContent>
@@ -10863,11 +10859,11 @@
   <p:clrMapOvr>
     <a:masterClrMapping/>
   </p:clrMapOvr>
-  <mc:AlternateContent xmlns:mc="http://schemas.openxmlformats.org/markup-compatibility/2006">
-    <mc:Choice xmlns:p14="http://schemas.microsoft.com/office/powerpoint/2010/main" Requires="p14">
+  <mc:AlternateContent xmlns:mc="http://schemas.openxmlformats.org/markup-compatibility/2006" xmlns:p14="http://schemas.microsoft.com/office/powerpoint/2010/main">
+    <mc:Choice Requires="p14">
       <p:transition p14:dur="0"/>
     </mc:Choice>
-    <mc:Fallback>
+    <mc:Fallback xmlns="">
       <p:transition/>
     </mc:Fallback>
   </mc:AlternateContent>

</xml_diff>

<commit_message>
Update gitbook 2023-03-24 20:25:15
</commit_message>
<xml_diff>
--- a/ApiConsumption/ApiQuestions.pptx
+++ b/ApiConsumption/ApiQuestions.pptx
@@ -4121,9 +4121,7 @@
             <a:r>
               <a:rPr lang="en-US" sz="3600" dirty="0">
                 <a:solidFill>
-                  <a:schemeClr val="tx1">
-                    <a:lumMod val="50000"/>
-                  </a:schemeClr>
+                  <a:schemeClr val="accent6"/>
                 </a:solidFill>
               </a:rPr>
               <a:t>Remember...</a:t>
@@ -4141,11 +4139,11 @@
   <p:clrMapOvr>
     <a:masterClrMapping/>
   </p:clrMapOvr>
-  <mc:AlternateContent xmlns:mc="http://schemas.openxmlformats.org/markup-compatibility/2006">
-    <mc:Choice xmlns:p14="http://schemas.microsoft.com/office/powerpoint/2010/main" Requires="p14">
+  <mc:AlternateContent xmlns:mc="http://schemas.openxmlformats.org/markup-compatibility/2006" xmlns:p14="http://schemas.microsoft.com/office/powerpoint/2010/main">
+    <mc:Choice Requires="p14">
       <p:transition p14:dur="0"/>
     </mc:Choice>
-    <mc:Fallback>
+    <mc:Fallback xmlns="">
       <p:transition/>
     </mc:Fallback>
   </mc:AlternateContent>
@@ -4252,11 +4250,11 @@
   <p:clrMapOvr>
     <a:masterClrMapping/>
   </p:clrMapOvr>
-  <mc:AlternateContent xmlns:mc="http://schemas.openxmlformats.org/markup-compatibility/2006">
-    <mc:Choice xmlns:p14="http://schemas.microsoft.com/office/powerpoint/2010/main" Requires="p14">
+  <mc:AlternateContent xmlns:mc="http://schemas.openxmlformats.org/markup-compatibility/2006" xmlns:p14="http://schemas.microsoft.com/office/powerpoint/2010/main">
+    <mc:Choice Requires="p14">
       <p:transition p14:dur="0"/>
     </mc:Choice>
-    <mc:Fallback>
+    <mc:Fallback xmlns="">
       <p:transition/>
     </mc:Fallback>
   </mc:AlternateContent>
@@ -4457,11 +4455,11 @@
   <p:clrMapOvr>
     <a:masterClrMapping/>
   </p:clrMapOvr>
-  <mc:AlternateContent xmlns:mc="http://schemas.openxmlformats.org/markup-compatibility/2006">
-    <mc:Choice xmlns:p14="http://schemas.microsoft.com/office/powerpoint/2010/main" Requires="p14">
+  <mc:AlternateContent xmlns:mc="http://schemas.openxmlformats.org/markup-compatibility/2006" xmlns:p14="http://schemas.microsoft.com/office/powerpoint/2010/main">
+    <mc:Choice Requires="p14">
       <p:transition p14:dur="0"/>
     </mc:Choice>
-    <mc:Fallback>
+    <mc:Fallback xmlns="">
       <p:transition/>
     </mc:Fallback>
   </mc:AlternateContent>
@@ -4662,11 +4660,11 @@
   <p:clrMapOvr>
     <a:masterClrMapping/>
   </p:clrMapOvr>
-  <mc:AlternateContent xmlns:mc="http://schemas.openxmlformats.org/markup-compatibility/2006">
-    <mc:Choice xmlns:p14="http://schemas.microsoft.com/office/powerpoint/2010/main" Requires="p14">
+  <mc:AlternateContent xmlns:mc="http://schemas.openxmlformats.org/markup-compatibility/2006" xmlns:p14="http://schemas.microsoft.com/office/powerpoint/2010/main">
+    <mc:Choice Requires="p14">
       <p:transition p14:dur="0"/>
     </mc:Choice>
-    <mc:Fallback>
+    <mc:Fallback xmlns="">
       <p:transition/>
     </mc:Fallback>
   </mc:AlternateContent>
@@ -4867,11 +4865,11 @@
   <p:clrMapOvr>
     <a:masterClrMapping/>
   </p:clrMapOvr>
-  <mc:AlternateContent xmlns:mc="http://schemas.openxmlformats.org/markup-compatibility/2006">
-    <mc:Choice xmlns:p14="http://schemas.microsoft.com/office/powerpoint/2010/main" Requires="p14">
+  <mc:AlternateContent xmlns:mc="http://schemas.openxmlformats.org/markup-compatibility/2006" xmlns:p14="http://schemas.microsoft.com/office/powerpoint/2010/main">
+    <mc:Choice Requires="p14">
       <p:transition p14:dur="0"/>
     </mc:Choice>
-    <mc:Fallback>
+    <mc:Fallback xmlns="">
       <p:transition/>
     </mc:Fallback>
   </mc:AlternateContent>
@@ -5074,11 +5072,11 @@
   <p:clrMapOvr>
     <a:masterClrMapping/>
   </p:clrMapOvr>
-  <mc:AlternateContent xmlns:mc="http://schemas.openxmlformats.org/markup-compatibility/2006">
-    <mc:Choice xmlns:p14="http://schemas.microsoft.com/office/powerpoint/2010/main" Requires="p14">
+  <mc:AlternateContent xmlns:mc="http://schemas.openxmlformats.org/markup-compatibility/2006" xmlns:p14="http://schemas.microsoft.com/office/powerpoint/2010/main">
+    <mc:Choice Requires="p14">
       <p:transition p14:dur="0"/>
     </mc:Choice>
-    <mc:Fallback>
+    <mc:Fallback xmlns="">
       <p:transition/>
     </mc:Fallback>
   </mc:AlternateContent>
@@ -5281,11 +5279,11 @@
   <p:clrMapOvr>
     <a:masterClrMapping/>
   </p:clrMapOvr>
-  <mc:AlternateContent xmlns:mc="http://schemas.openxmlformats.org/markup-compatibility/2006">
-    <mc:Choice xmlns:p14="http://schemas.microsoft.com/office/powerpoint/2010/main" Requires="p14">
+  <mc:AlternateContent xmlns:mc="http://schemas.openxmlformats.org/markup-compatibility/2006" xmlns:p14="http://schemas.microsoft.com/office/powerpoint/2010/main">
+    <mc:Choice Requires="p14">
       <p:transition p14:dur="0"/>
     </mc:Choice>
-    <mc:Fallback>
+    <mc:Fallback xmlns="">
       <p:transition/>
     </mc:Fallback>
   </mc:AlternateContent>
@@ -5483,11 +5481,11 @@
   <p:clrMapOvr>
     <a:masterClrMapping/>
   </p:clrMapOvr>
-  <mc:AlternateContent xmlns:mc="http://schemas.openxmlformats.org/markup-compatibility/2006">
-    <mc:Choice xmlns:p14="http://schemas.microsoft.com/office/powerpoint/2010/main" Requires="p14">
+  <mc:AlternateContent xmlns:mc="http://schemas.openxmlformats.org/markup-compatibility/2006" xmlns:p14="http://schemas.microsoft.com/office/powerpoint/2010/main">
+    <mc:Choice Requires="p14">
       <p:transition p14:dur="0"/>
     </mc:Choice>
-    <mc:Fallback>
+    <mc:Fallback xmlns="">
       <p:transition/>
     </mc:Fallback>
   </mc:AlternateContent>
@@ -5690,11 +5688,11 @@
   <p:clrMapOvr>
     <a:masterClrMapping/>
   </p:clrMapOvr>
-  <mc:AlternateContent xmlns:mc="http://schemas.openxmlformats.org/markup-compatibility/2006">
-    <mc:Choice xmlns:p14="http://schemas.microsoft.com/office/powerpoint/2010/main" Requires="p14">
+  <mc:AlternateContent xmlns:mc="http://schemas.openxmlformats.org/markup-compatibility/2006" xmlns:p14="http://schemas.microsoft.com/office/powerpoint/2010/main">
+    <mc:Choice Requires="p14">
       <p:transition p14:dur="0"/>
     </mc:Choice>
-    <mc:Fallback>
+    <mc:Fallback xmlns="">
       <p:transition/>
     </mc:Fallback>
   </mc:AlternateContent>
@@ -5909,11 +5907,11 @@
   <p:clrMapOvr>
     <a:masterClrMapping/>
   </p:clrMapOvr>
-  <mc:AlternateContent xmlns:mc="http://schemas.openxmlformats.org/markup-compatibility/2006">
-    <mc:Choice xmlns:p14="http://schemas.microsoft.com/office/powerpoint/2010/main" Requires="p14">
+  <mc:AlternateContent xmlns:mc="http://schemas.openxmlformats.org/markup-compatibility/2006" xmlns:p14="http://schemas.microsoft.com/office/powerpoint/2010/main">
+    <mc:Choice Requires="p14">
       <p:transition p14:dur="0"/>
     </mc:Choice>
-    <mc:Fallback>
+    <mc:Fallback xmlns="">
       <p:transition/>
     </mc:Fallback>
   </mc:AlternateContent>
@@ -6116,11 +6114,11 @@
   <p:clrMapOvr>
     <a:masterClrMapping/>
   </p:clrMapOvr>
-  <mc:AlternateContent xmlns:mc="http://schemas.openxmlformats.org/markup-compatibility/2006">
-    <mc:Choice xmlns:p14="http://schemas.microsoft.com/office/powerpoint/2010/main" Requires="p14">
+  <mc:AlternateContent xmlns:mc="http://schemas.openxmlformats.org/markup-compatibility/2006" xmlns:p14="http://schemas.microsoft.com/office/powerpoint/2010/main">
+    <mc:Choice Requires="p14">
       <p:transition p14:dur="0"/>
     </mc:Choice>
-    <mc:Fallback>
+    <mc:Fallback xmlns="">
       <p:transition/>
     </mc:Fallback>
   </mc:AlternateContent>
@@ -6337,11 +6335,11 @@
   <p:clrMapOvr>
     <a:masterClrMapping/>
   </p:clrMapOvr>
-  <mc:AlternateContent xmlns:mc="http://schemas.openxmlformats.org/markup-compatibility/2006">
-    <mc:Choice xmlns:p14="http://schemas.microsoft.com/office/powerpoint/2010/main" Requires="p14">
+  <mc:AlternateContent xmlns:mc="http://schemas.openxmlformats.org/markup-compatibility/2006" xmlns:p14="http://schemas.microsoft.com/office/powerpoint/2010/main">
+    <mc:Choice Requires="p14">
       <p:transition p14:dur="0"/>
     </mc:Choice>
-    <mc:Fallback>
+    <mc:Fallback xmlns="">
       <p:transition/>
     </mc:Fallback>
   </mc:AlternateContent>
@@ -6760,11 +6758,11 @@
   <p:clrMapOvr>
     <a:masterClrMapping/>
   </p:clrMapOvr>
-  <mc:AlternateContent xmlns:mc="http://schemas.openxmlformats.org/markup-compatibility/2006">
-    <mc:Choice xmlns:p14="http://schemas.microsoft.com/office/powerpoint/2010/main" Requires="p14">
+  <mc:AlternateContent xmlns:mc="http://schemas.openxmlformats.org/markup-compatibility/2006" xmlns:p14="http://schemas.microsoft.com/office/powerpoint/2010/main">
+    <mc:Choice Requires="p14">
       <p:transition p14:dur="0"/>
     </mc:Choice>
-    <mc:Fallback>
+    <mc:Fallback xmlns="">
       <p:transition/>
     </mc:Fallback>
   </mc:AlternateContent>
@@ -7185,11 +7183,11 @@
   <p:clrMapOvr>
     <a:masterClrMapping/>
   </p:clrMapOvr>
-  <mc:AlternateContent xmlns:mc="http://schemas.openxmlformats.org/markup-compatibility/2006">
-    <mc:Choice xmlns:p14="http://schemas.microsoft.com/office/powerpoint/2010/main" Requires="p14">
+  <mc:AlternateContent xmlns:mc="http://schemas.openxmlformats.org/markup-compatibility/2006" xmlns:p14="http://schemas.microsoft.com/office/powerpoint/2010/main">
+    <mc:Choice Requires="p14">
       <p:transition p14:dur="0"/>
     </mc:Choice>
-    <mc:Fallback>
+    <mc:Fallback xmlns="">
       <p:transition/>
     </mc:Fallback>
   </mc:AlternateContent>
@@ -7610,11 +7608,11 @@
   <p:clrMapOvr>
     <a:masterClrMapping/>
   </p:clrMapOvr>
-  <mc:AlternateContent xmlns:mc="http://schemas.openxmlformats.org/markup-compatibility/2006">
-    <mc:Choice xmlns:p14="http://schemas.microsoft.com/office/powerpoint/2010/main" Requires="p14">
+  <mc:AlternateContent xmlns:mc="http://schemas.openxmlformats.org/markup-compatibility/2006" xmlns:p14="http://schemas.microsoft.com/office/powerpoint/2010/main">
+    <mc:Choice Requires="p14">
       <p:transition p14:dur="0"/>
     </mc:Choice>
-    <mc:Fallback>
+    <mc:Fallback xmlns="">
       <p:transition/>
     </mc:Fallback>
   </mc:AlternateContent>
@@ -8033,11 +8031,11 @@
   <p:clrMapOvr>
     <a:masterClrMapping/>
   </p:clrMapOvr>
-  <mc:AlternateContent xmlns:mc="http://schemas.openxmlformats.org/markup-compatibility/2006">
-    <mc:Choice xmlns:p14="http://schemas.microsoft.com/office/powerpoint/2010/main" Requires="p14">
+  <mc:AlternateContent xmlns:mc="http://schemas.openxmlformats.org/markup-compatibility/2006" xmlns:p14="http://schemas.microsoft.com/office/powerpoint/2010/main">
+    <mc:Choice Requires="p14">
       <p:transition p14:dur="0"/>
     </mc:Choice>
-    <mc:Fallback>
+    <mc:Fallback xmlns="">
       <p:transition/>
     </mc:Fallback>
   </mc:AlternateContent>
@@ -8256,11 +8254,11 @@
   <p:clrMapOvr>
     <a:masterClrMapping/>
   </p:clrMapOvr>
-  <mc:AlternateContent xmlns:mc="http://schemas.openxmlformats.org/markup-compatibility/2006">
-    <mc:Choice xmlns:p14="http://schemas.microsoft.com/office/powerpoint/2010/main" Requires="p14">
+  <mc:AlternateContent xmlns:mc="http://schemas.openxmlformats.org/markup-compatibility/2006" xmlns:p14="http://schemas.microsoft.com/office/powerpoint/2010/main">
+    <mc:Choice Requires="p14">
       <p:transition p14:dur="0"/>
     </mc:Choice>
-    <mc:Fallback>
+    <mc:Fallback xmlns="">
       <p:transition/>
     </mc:Fallback>
   </mc:AlternateContent>
@@ -8537,11 +8535,11 @@
   <p:clrMapOvr>
     <a:masterClrMapping/>
   </p:clrMapOvr>
-  <mc:AlternateContent xmlns:mc="http://schemas.openxmlformats.org/markup-compatibility/2006">
-    <mc:Choice xmlns:p14="http://schemas.microsoft.com/office/powerpoint/2010/main" Requires="p14">
+  <mc:AlternateContent xmlns:mc="http://schemas.openxmlformats.org/markup-compatibility/2006" xmlns:p14="http://schemas.microsoft.com/office/powerpoint/2010/main">
+    <mc:Choice Requires="p14">
       <p:transition p14:dur="0"/>
     </mc:Choice>
-    <mc:Fallback>
+    <mc:Fallback xmlns="">
       <p:transition/>
     </mc:Fallback>
   </mc:AlternateContent>
@@ -8744,11 +8742,11 @@
   <p:clrMapOvr>
     <a:masterClrMapping/>
   </p:clrMapOvr>
-  <mc:AlternateContent xmlns:mc="http://schemas.openxmlformats.org/markup-compatibility/2006">
-    <mc:Choice xmlns:p14="http://schemas.microsoft.com/office/powerpoint/2010/main" Requires="p14">
+  <mc:AlternateContent xmlns:mc="http://schemas.openxmlformats.org/markup-compatibility/2006" xmlns:p14="http://schemas.microsoft.com/office/powerpoint/2010/main">
+    <mc:Choice Requires="p14">
       <p:transition p14:dur="0"/>
     </mc:Choice>
-    <mc:Fallback>
+    <mc:Fallback xmlns="">
       <p:transition/>
     </mc:Fallback>
   </mc:AlternateContent>
@@ -8937,9 +8935,7 @@
             <a:r>
               <a:rPr lang="en-US" sz="3600" dirty="0">
                 <a:solidFill>
-                  <a:schemeClr val="tx1">
-                    <a:lumMod val="50000"/>
-                  </a:schemeClr>
+                  <a:schemeClr val="accent6"/>
                 </a:solidFill>
               </a:rPr>
               <a:t>Questions?</a:t>
@@ -8957,11 +8953,11 @@
   <p:clrMapOvr>
     <a:masterClrMapping/>
   </p:clrMapOvr>
-  <mc:AlternateContent xmlns:mc="http://schemas.openxmlformats.org/markup-compatibility/2006">
-    <mc:Choice xmlns:p14="http://schemas.microsoft.com/office/powerpoint/2010/main" Requires="p14">
+  <mc:AlternateContent xmlns:mc="http://schemas.openxmlformats.org/markup-compatibility/2006" xmlns:p14="http://schemas.microsoft.com/office/powerpoint/2010/main">
+    <mc:Choice Requires="p14">
       <p:transition p14:dur="0"/>
     </mc:Choice>
-    <mc:Fallback>
+    <mc:Fallback xmlns="">
       <p:transition/>
     </mc:Fallback>
   </mc:AlternateContent>
@@ -9084,11 +9080,11 @@
   <p:clrMapOvr>
     <a:masterClrMapping/>
   </p:clrMapOvr>
-  <mc:AlternateContent xmlns:mc="http://schemas.openxmlformats.org/markup-compatibility/2006">
-    <mc:Choice xmlns:p14="http://schemas.microsoft.com/office/powerpoint/2010/main" Requires="p14">
+  <mc:AlternateContent xmlns:mc="http://schemas.openxmlformats.org/markup-compatibility/2006" xmlns:p14="http://schemas.microsoft.com/office/powerpoint/2010/main">
+    <mc:Choice Requires="p14">
       <p:transition p14:dur="0"/>
     </mc:Choice>
-    <mc:Fallback>
+    <mc:Fallback xmlns="">
       <p:transition/>
     </mc:Fallback>
   </mc:AlternateContent>
@@ -9305,11 +9301,11 @@
   <p:clrMapOvr>
     <a:masterClrMapping/>
   </p:clrMapOvr>
-  <mc:AlternateContent xmlns:mc="http://schemas.openxmlformats.org/markup-compatibility/2006">
-    <mc:Choice xmlns:p14="http://schemas.microsoft.com/office/powerpoint/2010/main" Requires="p14">
+  <mc:AlternateContent xmlns:mc="http://schemas.openxmlformats.org/markup-compatibility/2006" xmlns:p14="http://schemas.microsoft.com/office/powerpoint/2010/main">
+    <mc:Choice Requires="p14">
       <p:transition p14:dur="0"/>
     </mc:Choice>
-    <mc:Fallback>
+    <mc:Fallback xmlns="">
       <p:transition/>
     </mc:Fallback>
   </mc:AlternateContent>
@@ -9558,11 +9554,11 @@
   <p:clrMapOvr>
     <a:masterClrMapping/>
   </p:clrMapOvr>
-  <mc:AlternateContent xmlns:mc="http://schemas.openxmlformats.org/markup-compatibility/2006">
-    <mc:Choice xmlns:p14="http://schemas.microsoft.com/office/powerpoint/2010/main" Requires="p14">
+  <mc:AlternateContent xmlns:mc="http://schemas.openxmlformats.org/markup-compatibility/2006" xmlns:p14="http://schemas.microsoft.com/office/powerpoint/2010/main">
+    <mc:Choice Requires="p14">
       <p:transition p14:dur="0"/>
     </mc:Choice>
-    <mc:Fallback>
+    <mc:Fallback xmlns="">
       <p:transition/>
     </mc:Fallback>
   </mc:AlternateContent>
@@ -9872,11 +9868,11 @@
   <p:clrMapOvr>
     <a:masterClrMapping/>
   </p:clrMapOvr>
-  <mc:AlternateContent xmlns:mc="http://schemas.openxmlformats.org/markup-compatibility/2006">
-    <mc:Choice xmlns:p14="http://schemas.microsoft.com/office/powerpoint/2010/main" Requires="p14">
+  <mc:AlternateContent xmlns:mc="http://schemas.openxmlformats.org/markup-compatibility/2006" xmlns:p14="http://schemas.microsoft.com/office/powerpoint/2010/main">
+    <mc:Choice Requires="p14">
       <p:transition p14:dur="0"/>
     </mc:Choice>
-    <mc:Fallback>
+    <mc:Fallback xmlns="">
       <p:transition/>
     </mc:Fallback>
   </mc:AlternateContent>
@@ -10137,11 +10133,11 @@
   <p:clrMapOvr>
     <a:masterClrMapping/>
   </p:clrMapOvr>
-  <mc:AlternateContent xmlns:mc="http://schemas.openxmlformats.org/markup-compatibility/2006">
-    <mc:Choice xmlns:p14="http://schemas.microsoft.com/office/powerpoint/2010/main" Requires="p14">
+  <mc:AlternateContent xmlns:mc="http://schemas.openxmlformats.org/markup-compatibility/2006" xmlns:p14="http://schemas.microsoft.com/office/powerpoint/2010/main">
+    <mc:Choice Requires="p14">
       <p:transition p14:dur="0"/>
     </mc:Choice>
-    <mc:Fallback>
+    <mc:Fallback xmlns="">
       <p:transition/>
     </mc:Fallback>
   </mc:AlternateContent>
@@ -10514,11 +10510,11 @@
   <p:clrMapOvr>
     <a:masterClrMapping/>
   </p:clrMapOvr>
-  <mc:AlternateContent xmlns:mc="http://schemas.openxmlformats.org/markup-compatibility/2006">
-    <mc:Choice xmlns:p14="http://schemas.microsoft.com/office/powerpoint/2010/main" Requires="p14">
+  <mc:AlternateContent xmlns:mc="http://schemas.openxmlformats.org/markup-compatibility/2006" xmlns:p14="http://schemas.microsoft.com/office/powerpoint/2010/main">
+    <mc:Choice Requires="p14">
       <p:transition p14:dur="0"/>
     </mc:Choice>
-    <mc:Fallback>
+    <mc:Fallback xmlns="">
       <p:transition/>
     </mc:Fallback>
   </mc:AlternateContent>
@@ -10863,11 +10859,11 @@
   <p:clrMapOvr>
     <a:masterClrMapping/>
   </p:clrMapOvr>
-  <mc:AlternateContent xmlns:mc="http://schemas.openxmlformats.org/markup-compatibility/2006">
-    <mc:Choice xmlns:p14="http://schemas.microsoft.com/office/powerpoint/2010/main" Requires="p14">
+  <mc:AlternateContent xmlns:mc="http://schemas.openxmlformats.org/markup-compatibility/2006" xmlns:p14="http://schemas.microsoft.com/office/powerpoint/2010/main">
+    <mc:Choice Requires="p14">
       <p:transition p14:dur="0"/>
     </mc:Choice>
-    <mc:Fallback>
+    <mc:Fallback xmlns="">
       <p:transition/>
     </mc:Fallback>
   </mc:AlternateContent>

</xml_diff>